<commit_message>
Add AUROC on CKD
</commit_message>
<xml_diff>
--- a/Kapeleshh_CV_Purple.pptx
+++ b/Kapeleshh_CV_Purple.pptx
@@ -20999,7 +20999,7 @@
               <a:buChar char="●"/>
             </a:pPr>
             <a:r>
-              <a:rPr lang="en-IN" sz="1100">
+              <a:rPr lang="en-IN" sz="1100" dirty="0">
                 <a:solidFill>
                   <a:schemeClr val="dk1"/>
                 </a:solidFill>
@@ -21008,31 +21008,7 @@
                 <a:cs typeface="Calibri"/>
                 <a:sym typeface="Calibri"/>
               </a:rPr>
-              <a:t>92% </a:t>
-            </a:r>
-            <a:r>
-              <a:rPr lang="en-IN" sz="1100" dirty="0" err="1">
-                <a:solidFill>
-                  <a:schemeClr val="dk1"/>
-                </a:solidFill>
-                <a:latin typeface="Calibri"/>
-                <a:ea typeface="Calibri"/>
-                <a:cs typeface="Calibri"/>
-                <a:sym typeface="Calibri"/>
-              </a:rPr>
-              <a:t>roc_auc</a:t>
-            </a:r>
-            <a:r>
-              <a:rPr lang="en-IN" sz="1100" dirty="0">
-                <a:solidFill>
-                  <a:schemeClr val="dk1"/>
-                </a:solidFill>
-                <a:latin typeface="Calibri"/>
-                <a:ea typeface="Calibri"/>
-                <a:cs typeface="Calibri"/>
-                <a:sym typeface="Calibri"/>
-              </a:rPr>
-              <a:t> in </a:t>
+              <a:t>0.954% AUROC in </a:t>
             </a:r>
             <a:r>
               <a:rPr lang="en-IN" sz="1100" dirty="0">
@@ -21062,7 +21038,7 @@
                 <a:cs typeface="Calibri"/>
                 <a:sym typeface="Calibri"/>
               </a:rPr>
-              <a:t>1 year before onset</a:t>
+              <a:t>1 year before onset using CNN</a:t>
             </a:r>
             <a:endParaRPr sz="1100" b="0" i="0" u="none" strike="noStrike" cap="none" dirty="0">
               <a:solidFill>
@@ -21105,7 +21081,7 @@
                 <a:cs typeface="Calibri"/>
                 <a:sym typeface="Calibri"/>
               </a:rPr>
-              <a:t>Used 8 ML &amp; DL models </a:t>
+              <a:t>Used tree based models </a:t>
             </a:r>
             <a:r>
               <a:rPr lang="en-IN" sz="1100" b="0" i="0" u="none" strike="noStrike" cap="none" dirty="0">
@@ -21120,7 +21096,37 @@
                 <a:cs typeface="Calibri"/>
                 <a:sym typeface="Calibri"/>
               </a:rPr>
-              <a:t>on electronic health records from Insurance claims data</a:t>
+              <a:t>on </a:t>
+            </a:r>
+            <a:r>
+              <a:rPr lang="en-IN" sz="1100" dirty="0">
+                <a:solidFill>
+                  <a:schemeClr val="dk1"/>
+                </a:solidFill>
+                <a:highlight>
+                  <a:srgbClr val="FFFFFF"/>
+                </a:highlight>
+                <a:latin typeface="Calibri"/>
+                <a:ea typeface="Calibri"/>
+                <a:cs typeface="Calibri"/>
+                <a:sym typeface="Calibri"/>
+              </a:rPr>
+              <a:t>EHR</a:t>
+            </a:r>
+            <a:r>
+              <a:rPr lang="en-IN" sz="1100" b="0" i="0" u="none" strike="noStrike" cap="none" dirty="0">
+                <a:solidFill>
+                  <a:schemeClr val="dk1"/>
+                </a:solidFill>
+                <a:highlight>
+                  <a:srgbClr val="FFFFFF"/>
+                </a:highlight>
+                <a:latin typeface="Calibri"/>
+                <a:ea typeface="Calibri"/>
+                <a:cs typeface="Calibri"/>
+                <a:sym typeface="Calibri"/>
+              </a:rPr>
+              <a:t> from claims data for extracting important features</a:t>
             </a:r>
             <a:endParaRPr sz="1100" b="0" i="0" u="none" strike="noStrike" cap="none" dirty="0">
               <a:solidFill>

</xml_diff>

<commit_message>
Change CG and Update Preprint
</commit_message>
<xml_diff>
--- a/Kapeleshh_CV_Purple.pptx
+++ b/Kapeleshh_CV_Purple.pptx
@@ -19279,14 +19279,14 @@
           <p:nvPr>
             <p:extLst>
               <p:ext uri="{D42A27DB-BD31-4B8C-83A1-F6EECF244321}">
-                <p14:modId xmlns:p14="http://schemas.microsoft.com/office/powerpoint/2010/main" val="4099362146"/>
+                <p14:modId xmlns:p14="http://schemas.microsoft.com/office/powerpoint/2010/main" val="2498105619"/>
               </p:ext>
             </p:extLst>
           </p:nvPr>
         </p:nvGraphicFramePr>
         <p:xfrm>
           <a:off x="190107" y="939604"/>
-          <a:ext cx="6256775" cy="1419290"/>
+          <a:ext cx="6256775" cy="1419099"/>
         </p:xfrm>
         <a:graphic>
           <a:graphicData uri="http://schemas.openxmlformats.org/drawingml/2006/table">
@@ -19680,7 +19680,7 @@
                           <a:cs typeface="Calibri" panose="020F0502020204030204" pitchFamily="34" charset="0"/>
                           <a:sym typeface="Arial"/>
                         </a:rPr>
-                        <a:t>7.31/10</a:t>
+                        <a:t>7.78/10</a:t>
                       </a:r>
                       <a:endParaRPr sz="1200" u="none" strike="noStrike" cap="none" dirty="0">
                         <a:solidFill>
@@ -21128,6 +21128,71 @@
               </a:rPr>
               <a:t> from claims data for extracting important features</a:t>
             </a:r>
+          </a:p>
+          <a:p>
+            <a:pPr marL="174625" marR="0" lvl="0" indent="-168275" algn="l" rtl="0">
+              <a:lnSpc>
+                <a:spcPct val="100000"/>
+              </a:lnSpc>
+              <a:spcBef>
+                <a:spcPts val="0"/>
+              </a:spcBef>
+              <a:spcAft>
+                <a:spcPts val="0"/>
+              </a:spcAft>
+              <a:buClr>
+                <a:schemeClr val="dk1"/>
+              </a:buClr>
+              <a:buSzPts val="1100"/>
+              <a:buFont typeface="Arial"/>
+              <a:buChar char="●"/>
+            </a:pPr>
+            <a:r>
+              <a:rPr lang="en-IN" sz="1100" b="0" i="0" u="none" strike="noStrike" cap="none" dirty="0">
+                <a:solidFill>
+                  <a:schemeClr val="dk1"/>
+                </a:solidFill>
+                <a:highlight>
+                  <a:srgbClr val="FFFFFF"/>
+                </a:highlight>
+                <a:latin typeface="Calibri"/>
+                <a:ea typeface="Calibri"/>
+                <a:cs typeface="Calibri"/>
+                <a:sym typeface="Calibri"/>
+              </a:rPr>
+              <a:t>Published </a:t>
+            </a:r>
+            <a:r>
+              <a:rPr lang="en-IN" sz="1100" b="0" i="0" u="none" strike="noStrike" cap="none" dirty="0">
+                <a:solidFill>
+                  <a:schemeClr val="dk1"/>
+                </a:solidFill>
+                <a:highlight>
+                  <a:srgbClr val="FFFFFF"/>
+                </a:highlight>
+                <a:latin typeface="Calibri"/>
+                <a:ea typeface="Calibri"/>
+                <a:cs typeface="Calibri"/>
+                <a:sym typeface="Calibri"/>
+                <a:hlinkClick r:id="rId4"/>
+              </a:rPr>
+              <a:t>preprint</a:t>
+            </a:r>
+            <a:r>
+              <a:rPr lang="en-IN" sz="1100" b="0" i="0" u="none" strike="noStrike" cap="none" dirty="0">
+                <a:solidFill>
+                  <a:schemeClr val="dk1"/>
+                </a:solidFill>
+                <a:highlight>
+                  <a:srgbClr val="FFFFFF"/>
+                </a:highlight>
+                <a:latin typeface="Calibri"/>
+                <a:ea typeface="Calibri"/>
+                <a:cs typeface="Calibri"/>
+                <a:sym typeface="Calibri"/>
+              </a:rPr>
+              <a:t> of the paper on public health approach to prediction of CKD</a:t>
+            </a:r>
             <a:endParaRPr sz="1100" b="0" i="0" u="none" strike="noStrike" cap="none" dirty="0">
               <a:solidFill>
                 <a:schemeClr val="dk1"/>
@@ -24558,7 +24623,7 @@
           <p:nvPr/>
         </p:nvPicPr>
         <p:blipFill>
-          <a:blip r:embed="rId4"/>
+          <a:blip r:embed="rId5"/>
           <a:stretch>
             <a:fillRect/>
           </a:stretch>
@@ -24588,7 +24653,7 @@
           <p:nvPr/>
         </p:nvPicPr>
         <p:blipFill>
-          <a:blip r:embed="rId5"/>
+          <a:blip r:embed="rId6"/>
           <a:stretch>
             <a:fillRect/>
           </a:stretch>

</xml_diff>